<commit_message>
modify ppt and doc
</commit_message>
<xml_diff>
--- a/docs/Presentation.pptx
+++ b/docs/Presentation.pptx
@@ -5,10 +5,10 @@
     <p:sldMasterId id="2147483702" r:id="rId4"/>
   </p:sldMasterIdLst>
   <p:notesMasterIdLst>
-    <p:notesMasterId r:id="rId16"/>
+    <p:notesMasterId r:id="rId17"/>
   </p:notesMasterIdLst>
   <p:handoutMasterIdLst>
-    <p:handoutMasterId r:id="rId17"/>
+    <p:handoutMasterId r:id="rId18"/>
   </p:handoutMasterIdLst>
   <p:sldIdLst>
     <p:sldId id="256" r:id="rId5"/>
@@ -21,7 +21,8 @@
     <p:sldId id="299" r:id="rId12"/>
     <p:sldId id="300" r:id="rId13"/>
     <p:sldId id="302" r:id="rId14"/>
-    <p:sldId id="303" r:id="rId15"/>
+    <p:sldId id="304" r:id="rId15"/>
+    <p:sldId id="303" r:id="rId16"/>
   </p:sldIdLst>
   <p:sldSz cx="12192000" cy="6858000"/>
   <p:notesSz cx="6858000" cy="9144000"/>
@@ -248,7 +249,7 @@
           <a:p>
             <a:fld id="{F352A77B-D33C-49B3-A83C-450AA2ED72B3}" type="datetimeFigureOut">
               <a:rPr lang="en-US" smtClean="0"/>
-              <a:t>2/14/2026</a:t>
+              <a:t>2/15/2026</a:t>
             </a:fld>
             <a:endParaRPr lang="en-US" dirty="0"/>
           </a:p>
@@ -425,7 +426,7 @@
           <a:p>
             <a:fld id="{E38D8F9A-F5CB-4EF8-A859-ED5E107B9763}" type="datetimeFigureOut">
               <a:rPr lang="en-US" smtClean="0"/>
-              <a:t>2/14/2026</a:t>
+              <a:t>2/15/2026</a:t>
             </a:fld>
             <a:endParaRPr lang="en-US" dirty="0"/>
           </a:p>
@@ -839,7 +840,7 @@
           <a:p>
             <a:fld id="{9CCD5EB2-219C-4ADE-9396-FBC345A47DB3}" type="datetimeFigureOut">
               <a:rPr lang="en-US" smtClean="0"/>
-              <a:t>2/14/2026</a:t>
+              <a:t>2/15/2026</a:t>
             </a:fld>
             <a:endParaRPr lang="en-US"/>
           </a:p>
@@ -4774,6 +4775,450 @@
         <p:cNvPr id="1" name="">
           <a:extLst>
             <a:ext uri="{FF2B5EF4-FFF2-40B4-BE49-F238E27FC236}">
+              <a16:creationId xmlns:a16="http://schemas.microsoft.com/office/drawing/2014/main" id="{4ECF89F6-9EAE-2BAA-72D3-E9645AE9CF62}"/>
+            </a:ext>
+          </a:extLst>
+        </p:cNvPr>
+        <p:cNvGrpSpPr/>
+        <p:nvPr/>
+      </p:nvGrpSpPr>
+      <p:grpSpPr>
+        <a:xfrm>
+          <a:off x="0" y="0"/>
+          <a:ext cx="0" cy="0"/>
+          <a:chOff x="0" y="0"/>
+          <a:chExt cx="0" cy="0"/>
+        </a:xfrm>
+      </p:grpSpPr>
+      <p:sp>
+        <p:nvSpPr>
+          <p:cNvPr id="2" name="Title 1">
+            <a:extLst>
+              <a:ext uri="{FF2B5EF4-FFF2-40B4-BE49-F238E27FC236}">
+                <a16:creationId xmlns:a16="http://schemas.microsoft.com/office/drawing/2014/main" id="{DF25C925-5E0B-17E0-5414-91895BAEC78B}"/>
+              </a:ext>
+              <a:ext uri="{C183D7F6-B498-43B3-948B-1728B52AA6E4}">
+                <adec:decorative xmlns:adec="http://schemas.microsoft.com/office/drawing/2017/decorative" val="0"/>
+              </a:ext>
+            </a:extLst>
+          </p:cNvPr>
+          <p:cNvSpPr>
+            <a:spLocks noGrp="1"/>
+          </p:cNvSpPr>
+          <p:nvPr>
+            <p:ph type="title"/>
+          </p:nvPr>
+        </p:nvSpPr>
+        <p:spPr>
+          <a:xfrm>
+            <a:off x="1333498" y="498763"/>
+            <a:ext cx="7277102" cy="480263"/>
+          </a:xfrm>
+        </p:spPr>
+        <p:txBody>
+          <a:bodyPr>
+            <a:normAutofit fontScale="90000"/>
+          </a:bodyPr>
+          <a:lstStyle/>
+          <a:p>
+            <a:r>
+              <a:rPr lang="en-US" b="1" dirty="0"/>
+              <a:t>Appendix</a:t>
+            </a:r>
+          </a:p>
+        </p:txBody>
+      </p:sp>
+      <p:sp>
+        <p:nvSpPr>
+          <p:cNvPr id="4" name="Slide Number Placeholder 3">
+            <a:extLst>
+              <a:ext uri="{FF2B5EF4-FFF2-40B4-BE49-F238E27FC236}">
+                <a16:creationId xmlns:a16="http://schemas.microsoft.com/office/drawing/2014/main" id="{7F5064FB-7E06-50EA-BCBE-FC1CDCB940D1}"/>
+              </a:ext>
+            </a:extLst>
+          </p:cNvPr>
+          <p:cNvSpPr>
+            <a:spLocks noGrp="1"/>
+          </p:cNvSpPr>
+          <p:nvPr>
+            <p:ph type="sldNum" sz="quarter" idx="12"/>
+          </p:nvPr>
+        </p:nvSpPr>
+        <p:spPr/>
+        <p:txBody>
+          <a:bodyPr/>
+          <a:lstStyle/>
+          <a:p>
+            <a:fld id="{19B51A1E-902D-48AF-9020-955120F399B6}" type="slidenum">
+              <a:rPr lang="en-US" smtClean="0"/>
+              <a:pPr/>
+              <a:t>11</a:t>
+            </a:fld>
+            <a:endParaRPr lang="en-US" dirty="0"/>
+          </a:p>
+        </p:txBody>
+      </p:sp>
+      <p:sp>
+        <p:nvSpPr>
+          <p:cNvPr id="5" name="TextBox 4">
+            <a:extLst>
+              <a:ext uri="{FF2B5EF4-FFF2-40B4-BE49-F238E27FC236}">
+                <a16:creationId xmlns:a16="http://schemas.microsoft.com/office/drawing/2014/main" id="{1E8861AE-1DA0-9B6A-FD7F-F5B1FF9A1FF9}"/>
+              </a:ext>
+            </a:extLst>
+          </p:cNvPr>
+          <p:cNvSpPr txBox="1"/>
+          <p:nvPr/>
+        </p:nvSpPr>
+        <p:spPr>
+          <a:xfrm>
+            <a:off x="1727200" y="1468829"/>
+            <a:ext cx="9291782" cy="3148747"/>
+          </a:xfrm>
+          <a:prstGeom prst="rect">
+            <a:avLst/>
+          </a:prstGeom>
+          <a:noFill/>
+        </p:spPr>
+        <p:txBody>
+          <a:bodyPr wrap="square">
+            <a:spAutoFit/>
+          </a:bodyPr>
+          <a:lstStyle/>
+          <a:p>
+            <a:pPr marL="0" marR="0">
+              <a:lnSpc>
+                <a:spcPct val="115000"/>
+              </a:lnSpc>
+              <a:spcAft>
+                <a:spcPts val="800"/>
+              </a:spcAft>
+              <a:buNone/>
+            </a:pPr>
+            <a:r>
+              <a:rPr lang="en-US" sz="1800" kern="100" dirty="0">
+                <a:effectLst/>
+                <a:latin typeface="Aptos" panose="020B0004020202020204" pitchFamily="34" charset="0"/>
+                <a:ea typeface="Aptos" panose="020B0004020202020204" pitchFamily="34" charset="0"/>
+                <a:cs typeface="Times New Roman" panose="02020603050405020304" pitchFamily="18" charset="0"/>
+              </a:rPr>
+              <a:t>Deliverables:</a:t>
+            </a:r>
+          </a:p>
+          <a:p>
+            <a:pPr marL="342900" marR="0" lvl="0" indent="-342900">
+              <a:lnSpc>
+                <a:spcPct val="115000"/>
+              </a:lnSpc>
+              <a:buFont typeface="Symbol" panose="05050102010706020507" pitchFamily="18" charset="2"/>
+              <a:buChar char=""/>
+            </a:pPr>
+            <a:r>
+              <a:rPr lang="en-US" sz="1800" kern="100" dirty="0">
+                <a:effectLst/>
+                <a:latin typeface="Aptos" panose="020B0004020202020204" pitchFamily="34" charset="0"/>
+                <a:ea typeface="Aptos" panose="020B0004020202020204" pitchFamily="34" charset="0"/>
+                <a:cs typeface="Times New Roman" panose="02020603050405020304" pitchFamily="18" charset="0"/>
+              </a:rPr>
+              <a:t>Strategic &amp; Action Plans - </a:t>
+            </a:r>
+            <a:r>
+              <a:rPr lang="en-US" sz="1800" u="sng" kern="100" dirty="0">
+                <a:solidFill>
+                  <a:srgbClr val="467886"/>
+                </a:solidFill>
+                <a:effectLst/>
+                <a:latin typeface="Aptos" panose="020B0004020202020204" pitchFamily="34" charset="0"/>
+                <a:ea typeface="Aptos" panose="020B0004020202020204" pitchFamily="34" charset="0"/>
+                <a:cs typeface="Times New Roman" panose="02020603050405020304" pitchFamily="18" charset="0"/>
+                <a:hlinkClick r:id="rId2"/>
+              </a:rPr>
+              <a:t>1. Strategic and Action Plans</a:t>
+            </a:r>
+            <a:endParaRPr lang="en-US" sz="1800" kern="100" dirty="0">
+              <a:effectLst/>
+              <a:latin typeface="Aptos" panose="020B0004020202020204" pitchFamily="34" charset="0"/>
+              <a:ea typeface="Aptos" panose="020B0004020202020204" pitchFamily="34" charset="0"/>
+              <a:cs typeface="Times New Roman" panose="02020603050405020304" pitchFamily="18" charset="0"/>
+            </a:endParaRPr>
+          </a:p>
+          <a:p>
+            <a:pPr marL="342900" marR="0" lvl="0" indent="-342900">
+              <a:lnSpc>
+                <a:spcPct val="115000"/>
+              </a:lnSpc>
+              <a:buFont typeface="Symbol" panose="05050102010706020507" pitchFamily="18" charset="2"/>
+              <a:buChar char=""/>
+            </a:pPr>
+            <a:r>
+              <a:rPr lang="en-US" sz="1800" kern="100" dirty="0">
+                <a:effectLst/>
+                <a:latin typeface="Aptos" panose="020B0004020202020204" pitchFamily="34" charset="0"/>
+                <a:ea typeface="Aptos" panose="020B0004020202020204" pitchFamily="34" charset="0"/>
+                <a:cs typeface="Times New Roman" panose="02020603050405020304" pitchFamily="18" charset="0"/>
+              </a:rPr>
+              <a:t>Application Prototype - </a:t>
+            </a:r>
+            <a:r>
+              <a:rPr lang="en-US" sz="1800" u="sng" kern="100" dirty="0">
+                <a:solidFill>
+                  <a:srgbClr val="467886"/>
+                </a:solidFill>
+                <a:effectLst/>
+                <a:latin typeface="Aptos" panose="020B0004020202020204" pitchFamily="34" charset="0"/>
+                <a:ea typeface="Aptos" panose="020B0004020202020204" pitchFamily="34" charset="0"/>
+                <a:cs typeface="Times New Roman" panose="02020603050405020304" pitchFamily="18" charset="0"/>
+                <a:hlinkClick r:id="rId3"/>
+              </a:rPr>
+              <a:t>https://msc-ir-cw-v4ys66njic6dv7qjtvgrry.streamlit.app/</a:t>
+            </a:r>
+            <a:endParaRPr lang="en-US" sz="1800" kern="100" dirty="0">
+              <a:effectLst/>
+              <a:latin typeface="Aptos" panose="020B0004020202020204" pitchFamily="34" charset="0"/>
+              <a:ea typeface="Aptos" panose="020B0004020202020204" pitchFamily="34" charset="0"/>
+              <a:cs typeface="Times New Roman" panose="02020603050405020304" pitchFamily="18" charset="0"/>
+            </a:endParaRPr>
+          </a:p>
+          <a:p>
+            <a:pPr marL="342900" marR="0" lvl="0" indent="-342900">
+              <a:lnSpc>
+                <a:spcPct val="115000"/>
+              </a:lnSpc>
+              <a:buFont typeface="Symbol" panose="05050102010706020507" pitchFamily="18" charset="2"/>
+              <a:buChar char=""/>
+            </a:pPr>
+            <a:r>
+              <a:rPr lang="en-US" sz="1800" kern="100" dirty="0">
+                <a:effectLst/>
+                <a:latin typeface="Aptos" panose="020B0004020202020204" pitchFamily="34" charset="0"/>
+                <a:ea typeface="Aptos" panose="020B0004020202020204" pitchFamily="34" charset="0"/>
+                <a:cs typeface="Times New Roman" panose="02020603050405020304" pitchFamily="18" charset="0"/>
+              </a:rPr>
+              <a:t>System Architecture Diagram - </a:t>
+            </a:r>
+            <a:r>
+              <a:rPr lang="en-US" sz="1800" u="sng" kern="100" dirty="0">
+                <a:solidFill>
+                  <a:srgbClr val="467886"/>
+                </a:solidFill>
+                <a:effectLst/>
+                <a:latin typeface="Aptos" panose="020B0004020202020204" pitchFamily="34" charset="0"/>
+                <a:ea typeface="Aptos" panose="020B0004020202020204" pitchFamily="34" charset="0"/>
+                <a:cs typeface="Times New Roman" panose="02020603050405020304" pitchFamily="18" charset="0"/>
+                <a:hlinkClick r:id="rId4" action="ppaction://hlinkfile"/>
+              </a:rPr>
+              <a:t>System Architecture Diagram</a:t>
+            </a:r>
+            <a:endParaRPr lang="en-US" sz="1800" kern="100" dirty="0">
+              <a:effectLst/>
+              <a:latin typeface="Aptos" panose="020B0004020202020204" pitchFamily="34" charset="0"/>
+              <a:ea typeface="Aptos" panose="020B0004020202020204" pitchFamily="34" charset="0"/>
+              <a:cs typeface="Times New Roman" panose="02020603050405020304" pitchFamily="18" charset="0"/>
+            </a:endParaRPr>
+          </a:p>
+          <a:p>
+            <a:pPr marL="342900" marR="0" lvl="0" indent="-342900">
+              <a:lnSpc>
+                <a:spcPct val="115000"/>
+              </a:lnSpc>
+              <a:buFont typeface="Symbol" panose="05050102010706020507" pitchFamily="18" charset="2"/>
+              <a:buChar char=""/>
+            </a:pPr>
+            <a:r>
+              <a:rPr lang="en-US" sz="1800" kern="100" dirty="0">
+                <a:effectLst/>
+                <a:latin typeface="Aptos" panose="020B0004020202020204" pitchFamily="34" charset="0"/>
+                <a:ea typeface="Aptos" panose="020B0004020202020204" pitchFamily="34" charset="0"/>
+                <a:cs typeface="Times New Roman" panose="02020603050405020304" pitchFamily="18" charset="0"/>
+              </a:rPr>
+              <a:t>Dashboard Design - </a:t>
+            </a:r>
+            <a:r>
+              <a:rPr lang="en-US" sz="1800" u="sng" kern="100" dirty="0">
+                <a:solidFill>
+                  <a:srgbClr val="467886"/>
+                </a:solidFill>
+                <a:effectLst/>
+                <a:latin typeface="Aptos" panose="020B0004020202020204" pitchFamily="34" charset="0"/>
+                <a:ea typeface="Aptos" panose="020B0004020202020204" pitchFamily="34" charset="0"/>
+                <a:cs typeface="Times New Roman" panose="02020603050405020304" pitchFamily="18" charset="0"/>
+                <a:hlinkClick r:id="rId5" action="ppaction://hlinkfile"/>
+              </a:rPr>
+              <a:t>Dashboard Design</a:t>
+            </a:r>
+            <a:endParaRPr lang="en-US" sz="1800" kern="100" dirty="0">
+              <a:effectLst/>
+              <a:latin typeface="Aptos" panose="020B0004020202020204" pitchFamily="34" charset="0"/>
+              <a:ea typeface="Aptos" panose="020B0004020202020204" pitchFamily="34" charset="0"/>
+              <a:cs typeface="Times New Roman" panose="02020603050405020304" pitchFamily="18" charset="0"/>
+            </a:endParaRPr>
+          </a:p>
+          <a:p>
+            <a:pPr marL="342900" marR="0" lvl="0" indent="-342900">
+              <a:lnSpc>
+                <a:spcPct val="115000"/>
+              </a:lnSpc>
+              <a:buFont typeface="Symbol" panose="05050102010706020507" pitchFamily="18" charset="2"/>
+              <a:buChar char=""/>
+            </a:pPr>
+            <a:r>
+              <a:rPr lang="en-US" sz="1800" kern="100" dirty="0">
+                <a:effectLst/>
+                <a:latin typeface="Aptos" panose="020B0004020202020204" pitchFamily="34" charset="0"/>
+                <a:ea typeface="Aptos" panose="020B0004020202020204" pitchFamily="34" charset="0"/>
+                <a:cs typeface="Times New Roman" panose="02020603050405020304" pitchFamily="18" charset="0"/>
+              </a:rPr>
+              <a:t>Testing &amp; Evaluation Results - </a:t>
+            </a:r>
+            <a:r>
+              <a:rPr lang="en-US" sz="1800" u="sng" kern="100" dirty="0">
+                <a:solidFill>
+                  <a:srgbClr val="467886"/>
+                </a:solidFill>
+                <a:effectLst/>
+                <a:latin typeface="Aptos" panose="020B0004020202020204" pitchFamily="34" charset="0"/>
+                <a:ea typeface="Aptos" panose="020B0004020202020204" pitchFamily="34" charset="0"/>
+                <a:cs typeface="Times New Roman" panose="02020603050405020304" pitchFamily="18" charset="0"/>
+                <a:hlinkClick r:id="rId6" action="ppaction://hlinkfile"/>
+              </a:rPr>
+              <a:t>Testing &amp; Evaluation Results</a:t>
+            </a:r>
+            <a:endParaRPr lang="en-US" sz="1800" kern="100" dirty="0">
+              <a:effectLst/>
+              <a:latin typeface="Aptos" panose="020B0004020202020204" pitchFamily="34" charset="0"/>
+              <a:ea typeface="Aptos" panose="020B0004020202020204" pitchFamily="34" charset="0"/>
+              <a:cs typeface="Times New Roman" panose="02020603050405020304" pitchFamily="18" charset="0"/>
+            </a:endParaRPr>
+          </a:p>
+          <a:p>
+            <a:pPr marL="342900" marR="0" lvl="0" indent="-342900">
+              <a:lnSpc>
+                <a:spcPct val="115000"/>
+              </a:lnSpc>
+              <a:buFont typeface="Symbol" panose="05050102010706020507" pitchFamily="18" charset="2"/>
+              <a:buChar char=""/>
+            </a:pPr>
+            <a:r>
+              <a:rPr lang="en-US" sz="1800" kern="100" dirty="0">
+                <a:effectLst/>
+                <a:latin typeface="Aptos" panose="020B0004020202020204" pitchFamily="34" charset="0"/>
+                <a:ea typeface="Aptos" panose="020B0004020202020204" pitchFamily="34" charset="0"/>
+                <a:cs typeface="Times New Roman" panose="02020603050405020304" pitchFamily="18" charset="0"/>
+              </a:rPr>
+              <a:t>Final PDF Report – Uploaded to NIBM LMS</a:t>
+            </a:r>
+          </a:p>
+          <a:p>
+            <a:pPr marL="342900" marR="0" lvl="0" indent="-342900">
+              <a:lnSpc>
+                <a:spcPct val="115000"/>
+              </a:lnSpc>
+              <a:spcAft>
+                <a:spcPts val="800"/>
+              </a:spcAft>
+              <a:buFont typeface="Symbol" panose="05050102010706020507" pitchFamily="18" charset="2"/>
+              <a:buChar char=""/>
+            </a:pPr>
+            <a:r>
+              <a:rPr lang="en-US" sz="1800" kern="100" dirty="0">
+                <a:effectLst/>
+                <a:latin typeface="Aptos" panose="020B0004020202020204" pitchFamily="34" charset="0"/>
+                <a:ea typeface="Aptos" panose="020B0004020202020204" pitchFamily="34" charset="0"/>
+                <a:cs typeface="Times New Roman" panose="02020603050405020304" pitchFamily="18" charset="0"/>
+              </a:rPr>
+              <a:t>Presentation Slides &amp; Recording - </a:t>
+            </a:r>
+            <a:r>
+              <a:rPr lang="en-US" sz="1800" u="sng" kern="100" dirty="0">
+                <a:solidFill>
+                  <a:srgbClr val="467886"/>
+                </a:solidFill>
+                <a:effectLst/>
+                <a:latin typeface="Aptos" panose="020B0004020202020204" pitchFamily="34" charset="0"/>
+                <a:ea typeface="Aptos" panose="020B0004020202020204" pitchFamily="34" charset="0"/>
+                <a:cs typeface="Times New Roman" panose="02020603050405020304" pitchFamily="18" charset="0"/>
+                <a:hlinkClick r:id="rId7"/>
+              </a:rPr>
+              <a:t>7. Presentation Slides and Recording</a:t>
+            </a:r>
+            <a:endParaRPr lang="en-US" sz="1800" kern="100" dirty="0">
+              <a:effectLst/>
+              <a:latin typeface="Aptos" panose="020B0004020202020204" pitchFamily="34" charset="0"/>
+              <a:ea typeface="Aptos" panose="020B0004020202020204" pitchFamily="34" charset="0"/>
+              <a:cs typeface="Times New Roman" panose="02020603050405020304" pitchFamily="18" charset="0"/>
+            </a:endParaRPr>
+          </a:p>
+          <a:p>
+            <a:pPr marL="0" marR="0">
+              <a:lnSpc>
+                <a:spcPct val="115000"/>
+              </a:lnSpc>
+              <a:spcAft>
+                <a:spcPts val="800"/>
+              </a:spcAft>
+              <a:buNone/>
+            </a:pPr>
+            <a:r>
+              <a:rPr lang="en-US" sz="1800" kern="100" dirty="0" err="1">
+                <a:effectLst/>
+                <a:latin typeface="Aptos" panose="020B0004020202020204" pitchFamily="34" charset="0"/>
+                <a:ea typeface="Aptos" panose="020B0004020202020204" pitchFamily="34" charset="0"/>
+                <a:cs typeface="Times New Roman" panose="02020603050405020304" pitchFamily="18" charset="0"/>
+              </a:rPr>
+              <a:t>Github</a:t>
+            </a:r>
+            <a:r>
+              <a:rPr lang="en-US" sz="1800" kern="100" dirty="0">
+                <a:effectLst/>
+                <a:latin typeface="Aptos" panose="020B0004020202020204" pitchFamily="34" charset="0"/>
+                <a:ea typeface="Aptos" panose="020B0004020202020204" pitchFamily="34" charset="0"/>
+                <a:cs typeface="Times New Roman" panose="02020603050405020304" pitchFamily="18" charset="0"/>
+              </a:rPr>
+              <a:t> Repo – </a:t>
+            </a:r>
+            <a:r>
+              <a:rPr lang="en-US" sz="1800" u="sng" kern="100" dirty="0">
+                <a:solidFill>
+                  <a:srgbClr val="467886"/>
+                </a:solidFill>
+                <a:effectLst/>
+                <a:latin typeface="Aptos" panose="020B0004020202020204" pitchFamily="34" charset="0"/>
+                <a:ea typeface="Aptos" panose="020B0004020202020204" pitchFamily="34" charset="0"/>
+                <a:cs typeface="Times New Roman" panose="02020603050405020304" pitchFamily="18" charset="0"/>
+                <a:hlinkClick r:id="rId8"/>
+              </a:rPr>
+              <a:t>https://github.com/mdpw/msc-ir-cw</a:t>
+            </a:r>
+            <a:endParaRPr lang="en-US" sz="1800" kern="100" dirty="0">
+              <a:effectLst/>
+              <a:latin typeface="Aptos" panose="020B0004020202020204" pitchFamily="34" charset="0"/>
+              <a:ea typeface="Aptos" panose="020B0004020202020204" pitchFamily="34" charset="0"/>
+              <a:cs typeface="Times New Roman" panose="02020603050405020304" pitchFamily="18" charset="0"/>
+            </a:endParaRPr>
+          </a:p>
+        </p:txBody>
+      </p:sp>
+    </p:spTree>
+    <p:extLst>
+      <p:ext uri="{BB962C8B-B14F-4D97-AF65-F5344CB8AC3E}">
+        <p14:creationId xmlns:p14="http://schemas.microsoft.com/office/powerpoint/2010/main" val="460681455"/>
+      </p:ext>
+    </p:extLst>
+  </p:cSld>
+  <p:clrMapOvr>
+    <a:masterClrMapping/>
+  </p:clrMapOvr>
+</p:sld>
+</file>
+
+<file path=ppt/slides/slide12.xml><?xml version="1.0" encoding="utf-8"?>
+<p:sld xmlns:a="http://schemas.openxmlformats.org/drawingml/2006/main" xmlns:r="http://schemas.openxmlformats.org/officeDocument/2006/relationships" xmlns:p="http://schemas.openxmlformats.org/presentationml/2006/main">
+  <p:cSld>
+    <p:spTree>
+      <p:nvGrpSpPr>
+        <p:cNvPr id="1" name="">
+          <a:extLst>
+            <a:ext uri="{FF2B5EF4-FFF2-40B4-BE49-F238E27FC236}">
               <a16:creationId xmlns:a16="http://schemas.microsoft.com/office/drawing/2014/main" id="{D4AEBA88-AE61-3771-4E56-57ACB966BCE3}"/>
             </a:ext>
           </a:extLst>
@@ -4869,7 +5314,7 @@
             <a:fld id="{19B51A1E-902D-48AF-9020-955120F399B6}" type="slidenum">
               <a:rPr lang="en-US" smtClean="0"/>
               <a:pPr/>
-              <a:t>11</a:t>
+              <a:t>12</a:t>
             </a:fld>
             <a:endParaRPr lang="en-US" dirty="0"/>
           </a:p>
@@ -7498,12 +7943,23 @@
 </file>
 
 <file path=customXml/item1.xml><?xml version="1.0" encoding="utf-8"?>
-<?mso-contentType ?>
-<FormTemplates xmlns="http://schemas.microsoft.com/sharepoint/v3/contenttype/forms">
-  <Display>DocumentLibraryForm</Display>
-  <Edit>DocumentLibraryForm</Edit>
-  <New>DocumentLibraryForm</New>
-</FormTemplates>
+<p:properties xmlns:p="http://schemas.microsoft.com/office/2006/metadata/properties" xmlns:xsi="http://www.w3.org/2001/XMLSchema-instance" xmlns:pc="http://schemas.microsoft.com/office/infopath/2007/PartnerControls">
+  <documentManagement>
+    <_ip_UnifiedCompliancePolicyUIAction xmlns="http://schemas.microsoft.com/sharepoint/v3" xsi:nil="true"/>
+    <Image xmlns="71af3243-3dd4-4a8d-8c0d-dd76da1f02a5">
+      <Url xsi:nil="true"/>
+      <Description xsi:nil="true"/>
+    </Image>
+    <Status xmlns="71af3243-3dd4-4a8d-8c0d-dd76da1f02a5">Not started</Status>
+    <Background xmlns="71af3243-3dd4-4a8d-8c0d-dd76da1f02a5">false</Background>
+    <_ip_UnifiedCompliancePolicyProperties xmlns="http://schemas.microsoft.com/sharepoint/v3" xsi:nil="true"/>
+    <ImageTagsTaxHTField xmlns="71af3243-3dd4-4a8d-8c0d-dd76da1f02a5">
+      <Terms xmlns="http://schemas.microsoft.com/office/infopath/2007/PartnerControls"/>
+    </ImageTagsTaxHTField>
+    <TaxCatchAll xmlns="230e9df3-be65-4c73-a93b-d1236ebd677e" xsi:nil="true"/>
+    <MediaServiceKeyPoints xmlns="71af3243-3dd4-4a8d-8c0d-dd76da1f02a5" xsi:nil="true"/>
+  </documentManagement>
+</p:properties>
 </file>
 
 <file path=customXml/item2.xml><?xml version="1.0" encoding="utf-8"?>
@@ -7813,29 +8269,22 @@
 </file>
 
 <file path=customXml/item3.xml><?xml version="1.0" encoding="utf-8"?>
-<p:properties xmlns:p="http://schemas.microsoft.com/office/2006/metadata/properties" xmlns:xsi="http://www.w3.org/2001/XMLSchema-instance" xmlns:pc="http://schemas.microsoft.com/office/infopath/2007/PartnerControls">
-  <documentManagement>
-    <_ip_UnifiedCompliancePolicyUIAction xmlns="http://schemas.microsoft.com/sharepoint/v3" xsi:nil="true"/>
-    <Image xmlns="71af3243-3dd4-4a8d-8c0d-dd76da1f02a5">
-      <Url xsi:nil="true"/>
-      <Description xsi:nil="true"/>
-    </Image>
-    <Status xmlns="71af3243-3dd4-4a8d-8c0d-dd76da1f02a5">Not started</Status>
-    <Background xmlns="71af3243-3dd4-4a8d-8c0d-dd76da1f02a5">false</Background>
-    <_ip_UnifiedCompliancePolicyProperties xmlns="http://schemas.microsoft.com/sharepoint/v3" xsi:nil="true"/>
-    <ImageTagsTaxHTField xmlns="71af3243-3dd4-4a8d-8c0d-dd76da1f02a5">
-      <Terms xmlns="http://schemas.microsoft.com/office/infopath/2007/PartnerControls"/>
-    </ImageTagsTaxHTField>
-    <TaxCatchAll xmlns="230e9df3-be65-4c73-a93b-d1236ebd677e" xsi:nil="true"/>
-    <MediaServiceKeyPoints xmlns="71af3243-3dd4-4a8d-8c0d-dd76da1f02a5" xsi:nil="true"/>
-  </documentManagement>
-</p:properties>
+<?mso-contentType ?>
+<FormTemplates xmlns="http://schemas.microsoft.com/sharepoint/v3/contenttype/forms">
+  <Display>DocumentLibraryForm</Display>
+  <Edit>DocumentLibraryForm</Edit>
+  <New>DocumentLibraryForm</New>
+</FormTemplates>
 </file>
 
 <file path=customXml/itemProps1.xml><?xml version="1.0" encoding="utf-8"?>
-<ds:datastoreItem xmlns:ds="http://schemas.openxmlformats.org/officeDocument/2006/customXml" ds:itemID="{6966C46A-DC57-4209-80CD-9FE6C93151FF}">
+<ds:datastoreItem xmlns:ds="http://schemas.openxmlformats.org/officeDocument/2006/customXml" ds:itemID="{BEFFFA3F-0FB5-4ED3-8906-A15B16577F44}">
   <ds:schemaRefs>
-    <ds:schemaRef ds:uri="http://schemas.microsoft.com/sharepoint/v3/contenttype/forms"/>
+    <ds:schemaRef ds:uri="http://schemas.microsoft.com/office/2006/metadata/properties"/>
+    <ds:schemaRef ds:uri="http://schemas.microsoft.com/office/infopath/2007/PartnerControls"/>
+    <ds:schemaRef ds:uri="http://schemas.microsoft.com/sharepoint/v3"/>
+    <ds:schemaRef ds:uri="71af3243-3dd4-4a8d-8c0d-dd76da1f02a5"/>
+    <ds:schemaRef ds:uri="230e9df3-be65-4c73-a93b-d1236ebd677e"/>
   </ds:schemaRefs>
 </ds:datastoreItem>
 </file>
@@ -7862,13 +8311,9 @@
 </file>
 
 <file path=customXml/itemProps3.xml><?xml version="1.0" encoding="utf-8"?>
-<ds:datastoreItem xmlns:ds="http://schemas.openxmlformats.org/officeDocument/2006/customXml" ds:itemID="{BEFFFA3F-0FB5-4ED3-8906-A15B16577F44}">
+<ds:datastoreItem xmlns:ds="http://schemas.openxmlformats.org/officeDocument/2006/customXml" ds:itemID="{6966C46A-DC57-4209-80CD-9FE6C93151FF}">
   <ds:schemaRefs>
-    <ds:schemaRef ds:uri="http://schemas.microsoft.com/office/2006/metadata/properties"/>
-    <ds:schemaRef ds:uri="http://schemas.microsoft.com/office/infopath/2007/PartnerControls"/>
-    <ds:schemaRef ds:uri="http://schemas.microsoft.com/sharepoint/v3"/>
-    <ds:schemaRef ds:uri="71af3243-3dd4-4a8d-8c0d-dd76da1f02a5"/>
-    <ds:schemaRef ds:uri="230e9df3-be65-4c73-a93b-d1236ebd677e"/>
+    <ds:schemaRef ds:uri="http://schemas.microsoft.com/sharepoint/v3/contenttype/forms"/>
   </ds:schemaRefs>
 </ds:datastoreItem>
 </file>

</xml_diff>

<commit_message>
Doc and project repo finalized
</commit_message>
<xml_diff>
--- a/docs/Presentation.pptx
+++ b/docs/Presentation.pptx
@@ -4872,8 +4872,8 @@
         </p:nvSpPr>
         <p:spPr>
           <a:xfrm>
-            <a:off x="1727200" y="1468829"/>
-            <a:ext cx="9291782" cy="3148747"/>
+            <a:off x="1782617" y="1641459"/>
+            <a:ext cx="9291782" cy="1350819"/>
           </a:xfrm>
           <a:prstGeom prst="rect">
             <a:avLst/>
@@ -4885,6 +4885,34 @@
             <a:spAutoFit/>
           </a:bodyPr>
           <a:lstStyle/>
+          <a:p>
+            <a:pPr marR="0" lvl="0">
+              <a:lnSpc>
+                <a:spcPct val="115000"/>
+              </a:lnSpc>
+            </a:pPr>
+            <a:r>
+              <a:rPr lang="en-US" sz="1800" kern="100" dirty="0">
+                <a:effectLst/>
+                <a:latin typeface="Aptos" panose="020B0004020202020204" pitchFamily="34" charset="0"/>
+                <a:ea typeface="Aptos" panose="020B0004020202020204" pitchFamily="34" charset="0"/>
+                <a:cs typeface="Times New Roman" panose="02020603050405020304" pitchFamily="18" charset="0"/>
+              </a:rPr>
+              <a:t>Application Prototype - </a:t>
+            </a:r>
+            <a:r>
+              <a:rPr lang="en-US" u="sng" dirty="0">
+                <a:hlinkClick r:id="rId2"/>
+              </a:rPr>
+              <a:t>https://msc-ir-cw-isps.streamlit.app/</a:t>
+            </a:r>
+            <a:endParaRPr lang="en-US" sz="1800" kern="100" dirty="0">
+              <a:effectLst/>
+              <a:latin typeface="Aptos" panose="020B0004020202020204" pitchFamily="34" charset="0"/>
+              <a:ea typeface="Aptos" panose="020B0004020202020204" pitchFamily="34" charset="0"/>
+              <a:cs typeface="Times New Roman" panose="02020603050405020304" pitchFamily="18" charset="0"/>
+            </a:endParaRPr>
+          </a:p>
           <a:p>
             <a:pPr marL="0" marR="0">
               <a:lnSpc>
@@ -4896,68 +4924,22 @@
               <a:buNone/>
             </a:pPr>
             <a:r>
+              <a:rPr lang="en-US" sz="1800" kern="100" dirty="0" err="1">
+                <a:effectLst/>
+                <a:latin typeface="Aptos" panose="020B0004020202020204" pitchFamily="34" charset="0"/>
+                <a:ea typeface="Aptos" panose="020B0004020202020204" pitchFamily="34" charset="0"/>
+                <a:cs typeface="Times New Roman" panose="02020603050405020304" pitchFamily="18" charset="0"/>
+              </a:rPr>
+              <a:t>Github</a:t>
+            </a:r>
+            <a:r>
               <a:rPr lang="en-US" sz="1800" kern="100" dirty="0">
                 <a:effectLst/>
                 <a:latin typeface="Aptos" panose="020B0004020202020204" pitchFamily="34" charset="0"/>
                 <a:ea typeface="Aptos" panose="020B0004020202020204" pitchFamily="34" charset="0"/>
                 <a:cs typeface="Times New Roman" panose="02020603050405020304" pitchFamily="18" charset="0"/>
               </a:rPr>
-              <a:t>Deliverables:</a:t>
-            </a:r>
-          </a:p>
-          <a:p>
-            <a:pPr marL="342900" marR="0" lvl="0" indent="-342900">
-              <a:lnSpc>
-                <a:spcPct val="115000"/>
-              </a:lnSpc>
-              <a:buFont typeface="Symbol" panose="05050102010706020507" pitchFamily="18" charset="2"/>
-              <a:buChar char=""/>
-            </a:pPr>
-            <a:r>
-              <a:rPr lang="en-US" sz="1800" kern="100" dirty="0">
-                <a:effectLst/>
-                <a:latin typeface="Aptos" panose="020B0004020202020204" pitchFamily="34" charset="0"/>
-                <a:ea typeface="Aptos" panose="020B0004020202020204" pitchFamily="34" charset="0"/>
-                <a:cs typeface="Times New Roman" panose="02020603050405020304" pitchFamily="18" charset="0"/>
-              </a:rPr>
-              <a:t>Strategic &amp; Action Plans - </a:t>
-            </a:r>
-            <a:r>
-              <a:rPr lang="en-US" sz="1800" u="sng" kern="100" dirty="0">
-                <a:solidFill>
-                  <a:srgbClr val="467886"/>
-                </a:solidFill>
-                <a:effectLst/>
-                <a:latin typeface="Aptos" panose="020B0004020202020204" pitchFamily="34" charset="0"/>
-                <a:ea typeface="Aptos" panose="020B0004020202020204" pitchFamily="34" charset="0"/>
-                <a:cs typeface="Times New Roman" panose="02020603050405020304" pitchFamily="18" charset="0"/>
-                <a:hlinkClick r:id="rId2"/>
-              </a:rPr>
-              <a:t>1. Strategic and Action Plans</a:t>
-            </a:r>
-            <a:endParaRPr lang="en-US" sz="1800" kern="100" dirty="0">
-              <a:effectLst/>
-              <a:latin typeface="Aptos" panose="020B0004020202020204" pitchFamily="34" charset="0"/>
-              <a:ea typeface="Aptos" panose="020B0004020202020204" pitchFamily="34" charset="0"/>
-              <a:cs typeface="Times New Roman" panose="02020603050405020304" pitchFamily="18" charset="0"/>
-            </a:endParaRPr>
-          </a:p>
-          <a:p>
-            <a:pPr marL="342900" marR="0" lvl="0" indent="-342900">
-              <a:lnSpc>
-                <a:spcPct val="115000"/>
-              </a:lnSpc>
-              <a:buFont typeface="Symbol" panose="05050102010706020507" pitchFamily="18" charset="2"/>
-              <a:buChar char=""/>
-            </a:pPr>
-            <a:r>
-              <a:rPr lang="en-US" sz="1800" kern="100" dirty="0">
-                <a:effectLst/>
-                <a:latin typeface="Aptos" panose="020B0004020202020204" pitchFamily="34" charset="0"/>
-                <a:ea typeface="Aptos" panose="020B0004020202020204" pitchFamily="34" charset="0"/>
-                <a:cs typeface="Times New Roman" panose="02020603050405020304" pitchFamily="18" charset="0"/>
-              </a:rPr>
-              <a:t>Application Prototype - </a:t>
+              <a:t> Repo – </a:t>
             </a:r>
             <a:r>
               <a:rPr lang="en-US" sz="1800" u="sng" kern="100" dirty="0">
@@ -4970,33 +4952,9 @@
                 <a:cs typeface="Times New Roman" panose="02020603050405020304" pitchFamily="18" charset="0"/>
                 <a:hlinkClick r:id="rId3"/>
               </a:rPr>
-              <a:t>https://msc-ir-cw-v4ys66njic6dv7qjtvgrry.streamlit.app/</a:t>
-            </a:r>
-            <a:endParaRPr lang="en-US" sz="1800" kern="100" dirty="0">
-              <a:effectLst/>
-              <a:latin typeface="Aptos" panose="020B0004020202020204" pitchFamily="34" charset="0"/>
-              <a:ea typeface="Aptos" panose="020B0004020202020204" pitchFamily="34" charset="0"/>
-              <a:cs typeface="Times New Roman" panose="02020603050405020304" pitchFamily="18" charset="0"/>
-            </a:endParaRPr>
-          </a:p>
-          <a:p>
-            <a:pPr marL="342900" marR="0" lvl="0" indent="-342900">
-              <a:lnSpc>
-                <a:spcPct val="115000"/>
-              </a:lnSpc>
-              <a:buFont typeface="Symbol" panose="05050102010706020507" pitchFamily="18" charset="2"/>
-              <a:buChar char=""/>
-            </a:pPr>
-            <a:r>
-              <a:rPr lang="en-US" sz="1800" kern="100" dirty="0">
-                <a:effectLst/>
-                <a:latin typeface="Aptos" panose="020B0004020202020204" pitchFamily="34" charset="0"/>
-                <a:ea typeface="Aptos" panose="020B0004020202020204" pitchFamily="34" charset="0"/>
-                <a:cs typeface="Times New Roman" panose="02020603050405020304" pitchFamily="18" charset="0"/>
-              </a:rPr>
-              <a:t>System Architecture Diagram - </a:t>
-            </a:r>
-            <a:r>
+              <a:t>https://github.com/mdpw/msc-ir-cw</a:t>
+            </a:r>
+            <a:br>
               <a:rPr lang="en-US" sz="1800" u="sng" kern="100" dirty="0">
                 <a:solidFill>
                   <a:srgbClr val="467886"/>
@@ -5005,35 +4963,9 @@
                 <a:latin typeface="Aptos" panose="020B0004020202020204" pitchFamily="34" charset="0"/>
                 <a:ea typeface="Aptos" panose="020B0004020202020204" pitchFamily="34" charset="0"/>
                 <a:cs typeface="Times New Roman" panose="02020603050405020304" pitchFamily="18" charset="0"/>
-                <a:hlinkClick r:id="rId4" action="ppaction://hlinkfile"/>
               </a:rPr>
-              <a:t>System Architecture Diagram</a:t>
-            </a:r>
-            <a:endParaRPr lang="en-US" sz="1800" kern="100" dirty="0">
-              <a:effectLst/>
-              <a:latin typeface="Aptos" panose="020B0004020202020204" pitchFamily="34" charset="0"/>
-              <a:ea typeface="Aptos" panose="020B0004020202020204" pitchFamily="34" charset="0"/>
-              <a:cs typeface="Times New Roman" panose="02020603050405020304" pitchFamily="18" charset="0"/>
-            </a:endParaRPr>
-          </a:p>
-          <a:p>
-            <a:pPr marL="342900" marR="0" lvl="0" indent="-342900">
-              <a:lnSpc>
-                <a:spcPct val="115000"/>
-              </a:lnSpc>
-              <a:buFont typeface="Symbol" panose="05050102010706020507" pitchFamily="18" charset="2"/>
-              <a:buChar char=""/>
-            </a:pPr>
-            <a:r>
-              <a:rPr lang="en-US" sz="1800" kern="100" dirty="0">
-                <a:effectLst/>
-                <a:latin typeface="Aptos" panose="020B0004020202020204" pitchFamily="34" charset="0"/>
-                <a:ea typeface="Aptos" panose="020B0004020202020204" pitchFamily="34" charset="0"/>
-                <a:cs typeface="Times New Roman" panose="02020603050405020304" pitchFamily="18" charset="0"/>
-              </a:rPr>
-              <a:t>Dashboard Design - </a:t>
-            </a:r>
-            <a:r>
+            </a:br>
+            <a:br>
               <a:rPr lang="en-US" sz="1800" u="sng" kern="100" dirty="0">
                 <a:solidFill>
                   <a:srgbClr val="467886"/>
@@ -5042,25 +4974,8 @@
                 <a:latin typeface="Aptos" panose="020B0004020202020204" pitchFamily="34" charset="0"/>
                 <a:ea typeface="Aptos" panose="020B0004020202020204" pitchFamily="34" charset="0"/>
                 <a:cs typeface="Times New Roman" panose="02020603050405020304" pitchFamily="18" charset="0"/>
-                <a:hlinkClick r:id="rId5" action="ppaction://hlinkfile"/>
               </a:rPr>
-              <a:t>Dashboard Design</a:t>
-            </a:r>
-            <a:endParaRPr lang="en-US" sz="1800" kern="100" dirty="0">
-              <a:effectLst/>
-              <a:latin typeface="Aptos" panose="020B0004020202020204" pitchFamily="34" charset="0"/>
-              <a:ea typeface="Aptos" panose="020B0004020202020204" pitchFamily="34" charset="0"/>
-              <a:cs typeface="Times New Roman" panose="02020603050405020304" pitchFamily="18" charset="0"/>
-            </a:endParaRPr>
-          </a:p>
-          <a:p>
-            <a:pPr marL="342900" marR="0" lvl="0" indent="-342900">
-              <a:lnSpc>
-                <a:spcPct val="115000"/>
-              </a:lnSpc>
-              <a:buFont typeface="Symbol" panose="05050102010706020507" pitchFamily="18" charset="2"/>
-              <a:buChar char=""/>
-            </a:pPr>
+            </a:br>
             <a:r>
               <a:rPr lang="en-US" sz="1800" kern="100" dirty="0">
                 <a:effectLst/>
@@ -5068,133 +4983,8 @@
                 <a:ea typeface="Aptos" panose="020B0004020202020204" pitchFamily="34" charset="0"/>
                 <a:cs typeface="Times New Roman" panose="02020603050405020304" pitchFamily="18" charset="0"/>
               </a:rPr>
-              <a:t>Testing &amp; Evaluation Results - </a:t>
-            </a:r>
-            <a:r>
-              <a:rPr lang="en-US" sz="1800" u="sng" kern="100" dirty="0">
-                <a:solidFill>
-                  <a:srgbClr val="467886"/>
-                </a:solidFill>
-                <a:effectLst/>
-                <a:latin typeface="Aptos" panose="020B0004020202020204" pitchFamily="34" charset="0"/>
-                <a:ea typeface="Aptos" panose="020B0004020202020204" pitchFamily="34" charset="0"/>
-                <a:cs typeface="Times New Roman" panose="02020603050405020304" pitchFamily="18" charset="0"/>
-                <a:hlinkClick r:id="rId6" action="ppaction://hlinkfile"/>
-              </a:rPr>
-              <a:t>Testing &amp; Evaluation Results</a:t>
-            </a:r>
-            <a:endParaRPr lang="en-US" sz="1800" kern="100" dirty="0">
-              <a:effectLst/>
-              <a:latin typeface="Aptos" panose="020B0004020202020204" pitchFamily="34" charset="0"/>
-              <a:ea typeface="Aptos" panose="020B0004020202020204" pitchFamily="34" charset="0"/>
-              <a:cs typeface="Times New Roman" panose="02020603050405020304" pitchFamily="18" charset="0"/>
-            </a:endParaRPr>
-          </a:p>
-          <a:p>
-            <a:pPr marL="342900" marR="0" lvl="0" indent="-342900">
-              <a:lnSpc>
-                <a:spcPct val="115000"/>
-              </a:lnSpc>
-              <a:buFont typeface="Symbol" panose="05050102010706020507" pitchFamily="18" charset="2"/>
-              <a:buChar char=""/>
-            </a:pPr>
-            <a:r>
-              <a:rPr lang="en-US" sz="1800" kern="100" dirty="0">
-                <a:effectLst/>
-                <a:latin typeface="Aptos" panose="020B0004020202020204" pitchFamily="34" charset="0"/>
-                <a:ea typeface="Aptos" panose="020B0004020202020204" pitchFamily="34" charset="0"/>
-                <a:cs typeface="Times New Roman" panose="02020603050405020304" pitchFamily="18" charset="0"/>
-              </a:rPr>
-              <a:t>Final PDF Report – Uploaded to NIBM LMS</a:t>
-            </a:r>
-          </a:p>
-          <a:p>
-            <a:pPr marL="342900" marR="0" lvl="0" indent="-342900">
-              <a:lnSpc>
-                <a:spcPct val="115000"/>
-              </a:lnSpc>
-              <a:spcAft>
-                <a:spcPts val="800"/>
-              </a:spcAft>
-              <a:buFont typeface="Symbol" panose="05050102010706020507" pitchFamily="18" charset="2"/>
-              <a:buChar char=""/>
-            </a:pPr>
-            <a:r>
-              <a:rPr lang="en-US" sz="1800" kern="100" dirty="0">
-                <a:effectLst/>
-                <a:latin typeface="Aptos" panose="020B0004020202020204" pitchFamily="34" charset="0"/>
-                <a:ea typeface="Aptos" panose="020B0004020202020204" pitchFamily="34" charset="0"/>
-                <a:cs typeface="Times New Roman" panose="02020603050405020304" pitchFamily="18" charset="0"/>
-              </a:rPr>
-              <a:t>Presentation Slides &amp; Recording - </a:t>
-            </a:r>
-            <a:r>
-              <a:rPr lang="en-US" sz="1800" u="sng" kern="100" dirty="0">
-                <a:solidFill>
-                  <a:srgbClr val="467886"/>
-                </a:solidFill>
-                <a:effectLst/>
-                <a:latin typeface="Aptos" panose="020B0004020202020204" pitchFamily="34" charset="0"/>
-                <a:ea typeface="Aptos" panose="020B0004020202020204" pitchFamily="34" charset="0"/>
-                <a:cs typeface="Times New Roman" panose="02020603050405020304" pitchFamily="18" charset="0"/>
-                <a:hlinkClick r:id="rId7"/>
-              </a:rPr>
-              <a:t>7. Presentation Slides and Recording</a:t>
-            </a:r>
-            <a:endParaRPr lang="en-US" sz="1800" kern="100" dirty="0">
-              <a:effectLst/>
-              <a:latin typeface="Aptos" panose="020B0004020202020204" pitchFamily="34" charset="0"/>
-              <a:ea typeface="Aptos" panose="020B0004020202020204" pitchFamily="34" charset="0"/>
-              <a:cs typeface="Times New Roman" panose="02020603050405020304" pitchFamily="18" charset="0"/>
-            </a:endParaRPr>
-          </a:p>
-          <a:p>
-            <a:pPr marL="0" marR="0">
-              <a:lnSpc>
-                <a:spcPct val="115000"/>
-              </a:lnSpc>
-              <a:spcAft>
-                <a:spcPts val="800"/>
-              </a:spcAft>
-              <a:buNone/>
-            </a:pPr>
-            <a:r>
-              <a:rPr lang="en-US" sz="1800" kern="100" dirty="0" err="1">
-                <a:effectLst/>
-                <a:latin typeface="Aptos" panose="020B0004020202020204" pitchFamily="34" charset="0"/>
-                <a:ea typeface="Aptos" panose="020B0004020202020204" pitchFamily="34" charset="0"/>
-                <a:cs typeface="Times New Roman" panose="02020603050405020304" pitchFamily="18" charset="0"/>
-              </a:rPr>
-              <a:t>Github</a:t>
-            </a:r>
-            <a:r>
-              <a:rPr lang="en-US" sz="1800" kern="100" dirty="0">
-                <a:effectLst/>
-                <a:latin typeface="Aptos" panose="020B0004020202020204" pitchFamily="34" charset="0"/>
-                <a:ea typeface="Aptos" panose="020B0004020202020204" pitchFamily="34" charset="0"/>
-                <a:cs typeface="Times New Roman" panose="02020603050405020304" pitchFamily="18" charset="0"/>
-              </a:rPr>
-              <a:t> Repo – </a:t>
-            </a:r>
-            <a:r>
-              <a:rPr lang="en-US" sz="1800" u="sng" kern="100" dirty="0">
-                <a:solidFill>
-                  <a:srgbClr val="467886"/>
-                </a:solidFill>
-                <a:effectLst/>
-                <a:latin typeface="Aptos" panose="020B0004020202020204" pitchFamily="34" charset="0"/>
-                <a:ea typeface="Aptos" panose="020B0004020202020204" pitchFamily="34" charset="0"/>
-                <a:cs typeface="Times New Roman" panose="02020603050405020304" pitchFamily="18" charset="0"/>
-                <a:hlinkClick r:id="rId8"/>
-              </a:rPr>
-              <a:t>https://github.com/mdpw/msc-ir-cw</a:t>
-            </a:r>
-            <a:endParaRPr lang="en-US" sz="1800" kern="100" dirty="0">
-              <a:effectLst/>
-              <a:latin typeface="Aptos" panose="020B0004020202020204" pitchFamily="34" charset="0"/>
-              <a:ea typeface="Aptos" panose="020B0004020202020204" pitchFamily="34" charset="0"/>
-              <a:cs typeface="Times New Roman" panose="02020603050405020304" pitchFamily="18" charset="0"/>
-            </a:endParaRPr>
+              <a:t>Please refer to the Appendix section of the report for other deliverables</a:t>
+            </a:r>
           </a:p>
         </p:txBody>
       </p:sp>
@@ -5488,7 +5278,7 @@
             </a:pPr>
             <a:r>
               <a:rPr lang="en-US" sz="1800" dirty="0"/>
-              <a:t>Different actions in multiple annual action plans</a:t>
+              <a:t>18 actions in 2026 action plan</a:t>
             </a:r>
           </a:p>
           <a:p>
@@ -7943,23 +7733,12 @@
 </file>
 
 <file path=customXml/item1.xml><?xml version="1.0" encoding="utf-8"?>
-<p:properties xmlns:p="http://schemas.microsoft.com/office/2006/metadata/properties" xmlns:xsi="http://www.w3.org/2001/XMLSchema-instance" xmlns:pc="http://schemas.microsoft.com/office/infopath/2007/PartnerControls">
-  <documentManagement>
-    <_ip_UnifiedCompliancePolicyUIAction xmlns="http://schemas.microsoft.com/sharepoint/v3" xsi:nil="true"/>
-    <Image xmlns="71af3243-3dd4-4a8d-8c0d-dd76da1f02a5">
-      <Url xsi:nil="true"/>
-      <Description xsi:nil="true"/>
-    </Image>
-    <Status xmlns="71af3243-3dd4-4a8d-8c0d-dd76da1f02a5">Not started</Status>
-    <Background xmlns="71af3243-3dd4-4a8d-8c0d-dd76da1f02a5">false</Background>
-    <_ip_UnifiedCompliancePolicyProperties xmlns="http://schemas.microsoft.com/sharepoint/v3" xsi:nil="true"/>
-    <ImageTagsTaxHTField xmlns="71af3243-3dd4-4a8d-8c0d-dd76da1f02a5">
-      <Terms xmlns="http://schemas.microsoft.com/office/infopath/2007/PartnerControls"/>
-    </ImageTagsTaxHTField>
-    <TaxCatchAll xmlns="230e9df3-be65-4c73-a93b-d1236ebd677e" xsi:nil="true"/>
-    <MediaServiceKeyPoints xmlns="71af3243-3dd4-4a8d-8c0d-dd76da1f02a5" xsi:nil="true"/>
-  </documentManagement>
-</p:properties>
+<?mso-contentType ?>
+<FormTemplates xmlns="http://schemas.microsoft.com/sharepoint/v3/contenttype/forms">
+  <Display>DocumentLibraryForm</Display>
+  <Edit>DocumentLibraryForm</Edit>
+  <New>DocumentLibraryForm</New>
+</FormTemplates>
 </file>
 
 <file path=customXml/item2.xml><?xml version="1.0" encoding="utf-8"?>
@@ -8269,22 +8048,29 @@
 </file>
 
 <file path=customXml/item3.xml><?xml version="1.0" encoding="utf-8"?>
-<?mso-contentType ?>
-<FormTemplates xmlns="http://schemas.microsoft.com/sharepoint/v3/contenttype/forms">
-  <Display>DocumentLibraryForm</Display>
-  <Edit>DocumentLibraryForm</Edit>
-  <New>DocumentLibraryForm</New>
-</FormTemplates>
+<p:properties xmlns:p="http://schemas.microsoft.com/office/2006/metadata/properties" xmlns:xsi="http://www.w3.org/2001/XMLSchema-instance" xmlns:pc="http://schemas.microsoft.com/office/infopath/2007/PartnerControls">
+  <documentManagement>
+    <_ip_UnifiedCompliancePolicyUIAction xmlns="http://schemas.microsoft.com/sharepoint/v3" xsi:nil="true"/>
+    <Image xmlns="71af3243-3dd4-4a8d-8c0d-dd76da1f02a5">
+      <Url xsi:nil="true"/>
+      <Description xsi:nil="true"/>
+    </Image>
+    <Status xmlns="71af3243-3dd4-4a8d-8c0d-dd76da1f02a5">Not started</Status>
+    <Background xmlns="71af3243-3dd4-4a8d-8c0d-dd76da1f02a5">false</Background>
+    <_ip_UnifiedCompliancePolicyProperties xmlns="http://schemas.microsoft.com/sharepoint/v3" xsi:nil="true"/>
+    <ImageTagsTaxHTField xmlns="71af3243-3dd4-4a8d-8c0d-dd76da1f02a5">
+      <Terms xmlns="http://schemas.microsoft.com/office/infopath/2007/PartnerControls"/>
+    </ImageTagsTaxHTField>
+    <TaxCatchAll xmlns="230e9df3-be65-4c73-a93b-d1236ebd677e" xsi:nil="true"/>
+    <MediaServiceKeyPoints xmlns="71af3243-3dd4-4a8d-8c0d-dd76da1f02a5" xsi:nil="true"/>
+  </documentManagement>
+</p:properties>
 </file>
 
 <file path=customXml/itemProps1.xml><?xml version="1.0" encoding="utf-8"?>
-<ds:datastoreItem xmlns:ds="http://schemas.openxmlformats.org/officeDocument/2006/customXml" ds:itemID="{BEFFFA3F-0FB5-4ED3-8906-A15B16577F44}">
+<ds:datastoreItem xmlns:ds="http://schemas.openxmlformats.org/officeDocument/2006/customXml" ds:itemID="{6966C46A-DC57-4209-80CD-9FE6C93151FF}">
   <ds:schemaRefs>
-    <ds:schemaRef ds:uri="http://schemas.microsoft.com/office/2006/metadata/properties"/>
-    <ds:schemaRef ds:uri="http://schemas.microsoft.com/office/infopath/2007/PartnerControls"/>
-    <ds:schemaRef ds:uri="http://schemas.microsoft.com/sharepoint/v3"/>
-    <ds:schemaRef ds:uri="71af3243-3dd4-4a8d-8c0d-dd76da1f02a5"/>
-    <ds:schemaRef ds:uri="230e9df3-be65-4c73-a93b-d1236ebd677e"/>
+    <ds:schemaRef ds:uri="http://schemas.microsoft.com/sharepoint/v3/contenttype/forms"/>
   </ds:schemaRefs>
 </ds:datastoreItem>
 </file>
@@ -8311,9 +8097,13 @@
 </file>
 
 <file path=customXml/itemProps3.xml><?xml version="1.0" encoding="utf-8"?>
-<ds:datastoreItem xmlns:ds="http://schemas.openxmlformats.org/officeDocument/2006/customXml" ds:itemID="{6966C46A-DC57-4209-80CD-9FE6C93151FF}">
+<ds:datastoreItem xmlns:ds="http://schemas.openxmlformats.org/officeDocument/2006/customXml" ds:itemID="{BEFFFA3F-0FB5-4ED3-8906-A15B16577F44}">
   <ds:schemaRefs>
-    <ds:schemaRef ds:uri="http://schemas.microsoft.com/sharepoint/v3/contenttype/forms"/>
+    <ds:schemaRef ds:uri="http://schemas.microsoft.com/office/2006/metadata/properties"/>
+    <ds:schemaRef ds:uri="http://schemas.microsoft.com/office/infopath/2007/PartnerControls"/>
+    <ds:schemaRef ds:uri="http://schemas.microsoft.com/sharepoint/v3"/>
+    <ds:schemaRef ds:uri="71af3243-3dd4-4a8d-8c0d-dd76da1f02a5"/>
+    <ds:schemaRef ds:uri="230e9df3-be65-4c73-a93b-d1236ebd677e"/>
   </ds:schemaRefs>
 </ds:datastoreItem>
 </file>

</xml_diff>